<commit_message>
adding notes for simplegit
</commit_message>
<xml_diff>
--- a/Notes/summer2020/Git Version Control.pptx
+++ b/Notes/summer2020/Git Version Control.pptx
@@ -11,6 +11,7 @@
     <p:sldId id="259" r:id="rId5"/>
     <p:sldId id="260" r:id="rId6"/>
     <p:sldId id="261" r:id="rId7"/>
+    <p:sldId id="262" r:id="rId8"/>
   </p:sldIdLst>
   <p:sldSz cx="12192000" cy="6858000"/>
   <p:notesSz cx="6858000" cy="9144000"/>
@@ -264,7 +265,7 @@
           <a:p>
             <a:fld id="{2D87294F-9C1D-4F18-87FA-C54030CF6480}" type="datetimeFigureOut">
               <a:rPr lang="en-US" smtClean="0"/>
-              <a:t>7/12/2020</a:t>
+              <a:t>7/15/2020</a:t>
             </a:fld>
             <a:endParaRPr lang="en-US"/>
           </a:p>
@@ -462,7 +463,7 @@
           <a:p>
             <a:fld id="{2D87294F-9C1D-4F18-87FA-C54030CF6480}" type="datetimeFigureOut">
               <a:rPr lang="en-US" smtClean="0"/>
-              <a:t>7/12/2020</a:t>
+              <a:t>7/15/2020</a:t>
             </a:fld>
             <a:endParaRPr lang="en-US"/>
           </a:p>
@@ -670,7 +671,7 @@
           <a:p>
             <a:fld id="{2D87294F-9C1D-4F18-87FA-C54030CF6480}" type="datetimeFigureOut">
               <a:rPr lang="en-US" smtClean="0"/>
-              <a:t>7/12/2020</a:t>
+              <a:t>7/15/2020</a:t>
             </a:fld>
             <a:endParaRPr lang="en-US"/>
           </a:p>
@@ -868,7 +869,7 @@
           <a:p>
             <a:fld id="{2D87294F-9C1D-4F18-87FA-C54030CF6480}" type="datetimeFigureOut">
               <a:rPr lang="en-US" smtClean="0"/>
-              <a:t>7/12/2020</a:t>
+              <a:t>7/15/2020</a:t>
             </a:fld>
             <a:endParaRPr lang="en-US"/>
           </a:p>
@@ -1143,7 +1144,7 @@
           <a:p>
             <a:fld id="{2D87294F-9C1D-4F18-87FA-C54030CF6480}" type="datetimeFigureOut">
               <a:rPr lang="en-US" smtClean="0"/>
-              <a:t>7/12/2020</a:t>
+              <a:t>7/15/2020</a:t>
             </a:fld>
             <a:endParaRPr lang="en-US"/>
           </a:p>
@@ -1408,7 +1409,7 @@
           <a:p>
             <a:fld id="{2D87294F-9C1D-4F18-87FA-C54030CF6480}" type="datetimeFigureOut">
               <a:rPr lang="en-US" smtClean="0"/>
-              <a:t>7/12/2020</a:t>
+              <a:t>7/15/2020</a:t>
             </a:fld>
             <a:endParaRPr lang="en-US"/>
           </a:p>
@@ -1820,7 +1821,7 @@
           <a:p>
             <a:fld id="{2D87294F-9C1D-4F18-87FA-C54030CF6480}" type="datetimeFigureOut">
               <a:rPr lang="en-US" smtClean="0"/>
-              <a:t>7/12/2020</a:t>
+              <a:t>7/15/2020</a:t>
             </a:fld>
             <a:endParaRPr lang="en-US"/>
           </a:p>
@@ -1961,7 +1962,7 @@
           <a:p>
             <a:fld id="{2D87294F-9C1D-4F18-87FA-C54030CF6480}" type="datetimeFigureOut">
               <a:rPr lang="en-US" smtClean="0"/>
-              <a:t>7/12/2020</a:t>
+              <a:t>7/15/2020</a:t>
             </a:fld>
             <a:endParaRPr lang="en-US"/>
           </a:p>
@@ -2074,7 +2075,7 @@
           <a:p>
             <a:fld id="{2D87294F-9C1D-4F18-87FA-C54030CF6480}" type="datetimeFigureOut">
               <a:rPr lang="en-US" smtClean="0"/>
-              <a:t>7/12/2020</a:t>
+              <a:t>7/15/2020</a:t>
             </a:fld>
             <a:endParaRPr lang="en-US"/>
           </a:p>
@@ -2385,7 +2386,7 @@
           <a:p>
             <a:fld id="{2D87294F-9C1D-4F18-87FA-C54030CF6480}" type="datetimeFigureOut">
               <a:rPr lang="en-US" smtClean="0"/>
-              <a:t>7/12/2020</a:t>
+              <a:t>7/15/2020</a:t>
             </a:fld>
             <a:endParaRPr lang="en-US"/>
           </a:p>
@@ -2673,7 +2674,7 @@
           <a:p>
             <a:fld id="{2D87294F-9C1D-4F18-87FA-C54030CF6480}" type="datetimeFigureOut">
               <a:rPr lang="en-US" smtClean="0"/>
-              <a:t>7/12/2020</a:t>
+              <a:t>7/15/2020</a:t>
             </a:fld>
             <a:endParaRPr lang="en-US"/>
           </a:p>
@@ -2914,7 +2915,7 @@
           <a:p>
             <a:fld id="{2D87294F-9C1D-4F18-87FA-C54030CF6480}" type="datetimeFigureOut">
               <a:rPr lang="en-US" smtClean="0"/>
-              <a:t>7/12/2020</a:t>
+              <a:t>7/15/2020</a:t>
             </a:fld>
             <a:endParaRPr lang="en-US"/>
           </a:p>
@@ -3967,12 +3968,14 @@
         </p:nvSpPr>
         <p:spPr/>
         <p:txBody>
-          <a:bodyPr/>
-          <a:lstStyle/>
-          <a:p>
-            <a:r>
-              <a:rPr lang="en-US" dirty="0"/>
-              <a:t>To initialize a repository – git </a:t>
+          <a:bodyPr>
+            <a:normAutofit fontScale="92500" lnSpcReduction="10000"/>
+          </a:bodyPr>
+          <a:lstStyle/>
+          <a:p>
+            <a:r>
+              <a:rPr lang="en-US" dirty="0"/>
+              <a:t>git </a:t>
             </a:r>
             <a:r>
               <a:rPr lang="en-US" dirty="0" err="1"/>
@@ -3980,13 +3983,13 @@
             </a:r>
             <a:r>
               <a:rPr lang="en-US" dirty="0"/>
-              <a:t> (when inside correct directory)</a:t>
-            </a:r>
-          </a:p>
-          <a:p>
-            <a:r>
-              <a:rPr lang="en-US" dirty="0"/>
-              <a:t>To clone a directory (copy it from a URL) – git clone [</a:t>
+              <a:t> (when inside correct directory) -- To initialize a repository</a:t>
+            </a:r>
+          </a:p>
+          <a:p>
+            <a:r>
+              <a:rPr lang="en-US" dirty="0"/>
+              <a:t>git clone [</a:t>
             </a:r>
             <a:r>
               <a:rPr lang="en-US" dirty="0" err="1"/>
@@ -3994,7 +3997,7 @@
             </a:r>
             <a:r>
               <a:rPr lang="en-US" dirty="0"/>
-              <a:t>]</a:t>
+              <a:t>] -- To clone a directory (copy it from a URL) – </a:t>
             </a:r>
           </a:p>
           <a:p>
@@ -4007,11 +4010,49 @@
             <a:pPr lvl="1"/>
             <a:r>
               <a:rPr lang="en-US" dirty="0"/>
-              <a:t>Git add [file name(s)</a:t>
-            </a:r>
-          </a:p>
-          <a:p>
-            <a:endParaRPr lang="en-US" dirty="0"/>
+              <a:t>git add [file name(s) (separated by white space or using * syntax from </a:t>
+            </a:r>
+            <a:r>
+              <a:rPr lang="en-US" dirty="0" err="1"/>
+              <a:t>linux</a:t>
+            </a:r>
+            <a:r>
+              <a:rPr lang="en-US" dirty="0"/>
+              <a:t>)]</a:t>
+            </a:r>
+          </a:p>
+          <a:p>
+            <a:pPr lvl="1"/>
+            <a:r>
+              <a:rPr lang="en-US" dirty="0"/>
+              <a:t>git commit –m “with some msg here”</a:t>
+            </a:r>
+          </a:p>
+          <a:p>
+            <a:pPr lvl="1"/>
+            <a:r>
+              <a:rPr lang="en-US" dirty="0"/>
+              <a:t>git push</a:t>
+            </a:r>
+          </a:p>
+          <a:p>
+            <a:pPr lvl="2"/>
+            <a:r>
+              <a:rPr lang="en-US" dirty="0"/>
+              <a:t>Before adding, it is just modified, pre committing it is just staged. After committing it is in the snapshot. Pushing uploads the directory to the database.</a:t>
+            </a:r>
+          </a:p>
+          <a:p>
+            <a:r>
+              <a:rPr lang="en-US" dirty="0"/>
+              <a:t>git status – at any time you can call git status to see the status of your repository</a:t>
+            </a:r>
+          </a:p>
+          <a:p>
+            <a:r>
+              <a:rPr lang="en-US" dirty="0"/>
+              <a:t>git diff – shows un-staged changes (with --cached/--staged options we can see staged changes)</a:t>
+            </a:r>
           </a:p>
         </p:txBody>
       </p:sp>
@@ -4019,6 +4060,117 @@
     <p:extLst>
       <p:ext uri="{BB962C8B-B14F-4D97-AF65-F5344CB8AC3E}">
         <p14:creationId xmlns:p14="http://schemas.microsoft.com/office/powerpoint/2010/main" val="621531311"/>
+      </p:ext>
+    </p:extLst>
+  </p:cSld>
+  <p:clrMapOvr>
+    <a:masterClrMapping/>
+  </p:clrMapOvr>
+</p:sld>
+</file>
+
+<file path=ppt/slides/slide7.xml><?xml version="1.0" encoding="utf-8"?>
+<p:sld xmlns:a="http://schemas.openxmlformats.org/drawingml/2006/main" xmlns:r="http://schemas.openxmlformats.org/officeDocument/2006/relationships" xmlns:p="http://schemas.openxmlformats.org/presentationml/2006/main">
+  <p:cSld>
+    <p:spTree>
+      <p:nvGrpSpPr>
+        <p:cNvPr id="1" name=""/>
+        <p:cNvGrpSpPr/>
+        <p:nvPr/>
+      </p:nvGrpSpPr>
+      <p:grpSpPr>
+        <a:xfrm>
+          <a:off x="0" y="0"/>
+          <a:ext cx="0" cy="0"/>
+          <a:chOff x="0" y="0"/>
+          <a:chExt cx="0" cy="0"/>
+        </a:xfrm>
+      </p:grpSpPr>
+      <p:sp>
+        <p:nvSpPr>
+          <p:cNvPr id="2" name="Title 1">
+            <a:extLst>
+              <a:ext uri="{FF2B5EF4-FFF2-40B4-BE49-F238E27FC236}">
+                <a16:creationId xmlns:a16="http://schemas.microsoft.com/office/drawing/2014/main" id="{15AD3E84-CA09-42ED-9685-F6C7754A9F9A}"/>
+              </a:ext>
+            </a:extLst>
+          </p:cNvPr>
+          <p:cNvSpPr>
+            <a:spLocks noGrp="1"/>
+          </p:cNvSpPr>
+          <p:nvPr>
+            <p:ph type="title"/>
+          </p:nvPr>
+        </p:nvSpPr>
+        <p:spPr/>
+        <p:txBody>
+          <a:bodyPr/>
+          <a:lstStyle/>
+          <a:p>
+            <a:r>
+              <a:rPr lang="en-US" dirty="0"/>
+              <a:t>Basic Commands (cont.)</a:t>
+            </a:r>
+          </a:p>
+        </p:txBody>
+      </p:sp>
+      <p:sp>
+        <p:nvSpPr>
+          <p:cNvPr id="3" name="Content Placeholder 2">
+            <a:extLst>
+              <a:ext uri="{FF2B5EF4-FFF2-40B4-BE49-F238E27FC236}">
+                <a16:creationId xmlns:a16="http://schemas.microsoft.com/office/drawing/2014/main" id="{AEDC133E-6B81-4ADF-8A1C-194C7B68C262}"/>
+              </a:ext>
+            </a:extLst>
+          </p:cNvPr>
+          <p:cNvSpPr>
+            <a:spLocks noGrp="1"/>
+          </p:cNvSpPr>
+          <p:nvPr>
+            <p:ph idx="1"/>
+          </p:nvPr>
+        </p:nvSpPr>
+        <p:spPr/>
+        <p:txBody>
+          <a:bodyPr/>
+          <a:lstStyle/>
+          <a:p>
+            <a:r>
+              <a:rPr lang="en-US" dirty="0"/>
+              <a:t>git rm – works to remove a file from the commit</a:t>
+            </a:r>
+          </a:p>
+          <a:p>
+            <a:pPr lvl="1"/>
+            <a:r>
+              <a:rPr lang="en-US" dirty="0"/>
+              <a:t>--cached flag will only remove it from the git repository tracking, but keep the local copy</a:t>
+            </a:r>
+          </a:p>
+          <a:p>
+            <a:r>
+              <a:rPr lang="en-US" dirty="0"/>
+              <a:t>git mv [a] [b] – moves the file from location a to location b</a:t>
+            </a:r>
+          </a:p>
+          <a:p>
+            <a:r>
+              <a:rPr lang="en-US" dirty="0"/>
+              <a:t>git log – provides the user with information about the repository’s history</a:t>
+            </a:r>
+          </a:p>
+          <a:p>
+            <a:r>
+              <a:rPr lang="en-US" dirty="0"/>
+              <a:t>Note: There are many, many more commands. This is merely a brief introduction to the absolute basic necessities associated with git – you can find more information at cheat sheet and the git book on the git website</a:t>
+            </a:r>
+          </a:p>
+        </p:txBody>
+      </p:sp>
+    </p:spTree>
+    <p:extLst>
+      <p:ext uri="{BB962C8B-B14F-4D97-AF65-F5344CB8AC3E}">
+        <p14:creationId xmlns:p14="http://schemas.microsoft.com/office/powerpoint/2010/main" val="1759283798"/>
       </p:ext>
     </p:extLst>
   </p:cSld>

</xml_diff>